<commit_message>
Update the presentation's screener info
</commit_message>
<xml_diff>
--- a/Project3.pptx
+++ b/Project3.pptx
@@ -5,18 +5,20 @@
     <p:sldMasterId id="2147483648" r:id="rId1"/>
   </p:sldMasterIdLst>
   <p:notesMasterIdLst>
-    <p:notesMasterId r:id="rId11"/>
+    <p:notesMasterId r:id="rId13"/>
   </p:notesMasterIdLst>
   <p:sldIdLst>
     <p:sldId id="256" r:id="rId2"/>
     <p:sldId id="257" r:id="rId3"/>
     <p:sldId id="259" r:id="rId4"/>
-    <p:sldId id="258" r:id="rId5"/>
-    <p:sldId id="262" r:id="rId6"/>
-    <p:sldId id="261" r:id="rId7"/>
-    <p:sldId id="263" r:id="rId8"/>
-    <p:sldId id="264" r:id="rId9"/>
-    <p:sldId id="260" r:id="rId10"/>
+    <p:sldId id="265" r:id="rId5"/>
+    <p:sldId id="258" r:id="rId6"/>
+    <p:sldId id="262" r:id="rId7"/>
+    <p:sldId id="266" r:id="rId8"/>
+    <p:sldId id="261" r:id="rId9"/>
+    <p:sldId id="263" r:id="rId10"/>
+    <p:sldId id="267" r:id="rId11"/>
+    <p:sldId id="260" r:id="rId12"/>
   </p:sldIdLst>
   <p:sldSz cx="9144000" cy="5143500" type="screen16x9"/>
   <p:notesSz cx="6858000" cy="9144000"/>
@@ -548,7 +550,7 @@
           <a:p>
             <a:fld id="{87350B06-B074-48FC-8CFD-53D2CD8FB95F}" type="slidenum">
               <a:rPr lang="en-US" smtClean="0"/>
-              <a:t>9</a:t>
+              <a:t>11</a:t>
             </a:fld>
             <a:endParaRPr lang="en-US"/>
           </a:p>
@@ -4185,6 +4187,187 @@
 </p:sld>
 </file>
 
+<file path=ppt/slides/slide10.xml><?xml version="1.0" encoding="utf-8"?>
+<p:sld xmlns:a="http://schemas.openxmlformats.org/drawingml/2006/main" xmlns:r="http://schemas.openxmlformats.org/officeDocument/2006/relationships" xmlns:p="http://schemas.openxmlformats.org/presentationml/2006/main">
+  <p:cSld>
+    <p:spTree>
+      <p:nvGrpSpPr>
+        <p:cNvPr id="1" name=""/>
+        <p:cNvGrpSpPr/>
+        <p:nvPr/>
+      </p:nvGrpSpPr>
+      <p:grpSpPr>
+        <a:xfrm>
+          <a:off x="0" y="0"/>
+          <a:ext cx="0" cy="0"/>
+          <a:chOff x="0" y="0"/>
+          <a:chExt cx="0" cy="0"/>
+        </a:xfrm>
+      </p:grpSpPr>
+      <p:sp>
+        <p:nvSpPr>
+          <p:cNvPr id="2" name="Title 1">
+            <a:extLst>
+              <a:ext uri="{FF2B5EF4-FFF2-40B4-BE49-F238E27FC236}">
+                <a16:creationId xmlns:a16="http://schemas.microsoft.com/office/drawing/2014/main" id="{FEA38C25-27E3-D56A-E0A7-B2C4631A6B0B}"/>
+              </a:ext>
+            </a:extLst>
+          </p:cNvPr>
+          <p:cNvSpPr>
+            <a:spLocks noGrp="1"/>
+          </p:cNvSpPr>
+          <p:nvPr>
+            <p:ph type="title"/>
+          </p:nvPr>
+        </p:nvSpPr>
+        <p:spPr/>
+        <p:txBody>
+          <a:bodyPr/>
+          <a:lstStyle/>
+          <a:p>
+            <a:r>
+              <a:rPr lang="en-US" dirty="0"/>
+              <a:t>Expansion ideas</a:t>
+            </a:r>
+          </a:p>
+        </p:txBody>
+      </p:sp>
+      <p:sp>
+        <p:nvSpPr>
+          <p:cNvPr id="8" name="Content Placeholder 7">
+            <a:extLst>
+              <a:ext uri="{FF2B5EF4-FFF2-40B4-BE49-F238E27FC236}">
+                <a16:creationId xmlns:a16="http://schemas.microsoft.com/office/drawing/2014/main" id="{21A27ACF-A08D-364D-99A9-7CADCF2F3D83}"/>
+              </a:ext>
+            </a:extLst>
+          </p:cNvPr>
+          <p:cNvSpPr>
+            <a:spLocks noGrp="1"/>
+          </p:cNvSpPr>
+          <p:nvPr>
+            <p:ph idx="1"/>
+          </p:nvPr>
+        </p:nvSpPr>
+        <p:spPr/>
+        <p:txBody>
+          <a:bodyPr>
+            <a:normAutofit/>
+          </a:bodyPr>
+          <a:lstStyle/>
+          <a:p>
+            <a:r>
+              <a:rPr lang="en-US" sz="1800" dirty="0"/>
+              <a:t>The screener can be extended to wider pool of stocks, ETFs &amp; other securities.</a:t>
+            </a:r>
+          </a:p>
+          <a:p>
+            <a:r>
+              <a:rPr lang="en-US" sz="1800" dirty="0"/>
+              <a:t>If integrated with a user based database, we could even push notifications based on the screening criteria.</a:t>
+            </a:r>
+          </a:p>
+          <a:p>
+            <a:r>
+              <a:rPr lang="en-US" sz="1800" dirty="0"/>
+              <a:t>The </a:t>
+            </a:r>
+            <a:r>
+              <a:rPr lang="en-US" sz="1800" dirty="0" err="1"/>
+              <a:t>algo</a:t>
+            </a:r>
+            <a:r>
+              <a:rPr lang="en-US" sz="1800" dirty="0"/>
+              <a:t> trading can provide a lot more commonly used algorithm &amp; let the user back test the algorithm before deploying it in </a:t>
+            </a:r>
+            <a:r>
+              <a:rPr lang="en-US" sz="1800" dirty="0" err="1"/>
+              <a:t>realtime</a:t>
+            </a:r>
+            <a:r>
+              <a:rPr lang="en-US" sz="1800" dirty="0"/>
+              <a:t>.</a:t>
+            </a:r>
+          </a:p>
+        </p:txBody>
+      </p:sp>
+    </p:spTree>
+    <p:extLst>
+      <p:ext uri="{BB962C8B-B14F-4D97-AF65-F5344CB8AC3E}">
+        <p14:creationId xmlns:p14="http://schemas.microsoft.com/office/powerpoint/2010/main" val="1462840012"/>
+      </p:ext>
+    </p:extLst>
+  </p:cSld>
+  <p:clrMapOvr>
+    <a:masterClrMapping/>
+  </p:clrMapOvr>
+</p:sld>
+</file>
+
+<file path=ppt/slides/slide11.xml><?xml version="1.0" encoding="utf-8"?>
+<p:sld xmlns:a="http://schemas.openxmlformats.org/drawingml/2006/main" xmlns:r="http://schemas.openxmlformats.org/officeDocument/2006/relationships" xmlns:p="http://schemas.openxmlformats.org/presentationml/2006/main">
+  <p:cSld>
+    <p:spTree>
+      <p:nvGrpSpPr>
+        <p:cNvPr id="1" name=""/>
+        <p:cNvGrpSpPr/>
+        <p:nvPr/>
+      </p:nvGrpSpPr>
+      <p:grpSpPr>
+        <a:xfrm>
+          <a:off x="0" y="0"/>
+          <a:ext cx="0" cy="0"/>
+          <a:chOff x="0" y="0"/>
+          <a:chExt cx="0" cy="0"/>
+        </a:xfrm>
+      </p:grpSpPr>
+      <p:sp>
+        <p:nvSpPr>
+          <p:cNvPr id="4" name="TextBox 3">
+            <a:extLst>
+              <a:ext uri="{FF2B5EF4-FFF2-40B4-BE49-F238E27FC236}">
+                <a16:creationId xmlns:a16="http://schemas.microsoft.com/office/drawing/2014/main" id="{051D674C-A884-F0EF-625A-4D3B1999007F}"/>
+              </a:ext>
+            </a:extLst>
+          </p:cNvPr>
+          <p:cNvSpPr txBox="1"/>
+          <p:nvPr/>
+        </p:nvSpPr>
+        <p:spPr>
+          <a:xfrm>
+            <a:off x="3941064" y="2313432"/>
+            <a:ext cx="2587752" cy="523220"/>
+          </a:xfrm>
+          <a:prstGeom prst="rect">
+            <a:avLst/>
+          </a:prstGeom>
+          <a:noFill/>
+        </p:spPr>
+        <p:txBody>
+          <a:bodyPr wrap="square" rtlCol="0">
+            <a:spAutoFit/>
+          </a:bodyPr>
+          <a:lstStyle/>
+          <a:p>
+            <a:r>
+              <a:rPr lang="en-US" sz="2800" b="1" dirty="0"/>
+              <a:t>Questions?</a:t>
+            </a:r>
+          </a:p>
+        </p:txBody>
+      </p:sp>
+    </p:spTree>
+    <p:extLst>
+      <p:ext uri="{BB962C8B-B14F-4D97-AF65-F5344CB8AC3E}">
+        <p14:creationId xmlns:p14="http://schemas.microsoft.com/office/powerpoint/2010/main" val="109100692"/>
+      </p:ext>
+    </p:extLst>
+  </p:cSld>
+  <p:clrMapOvr>
+    <a:masterClrMapping/>
+  </p:clrMapOvr>
+</p:sld>
+</file>
+
 <file path=ppt/slides/slide2.xml><?xml version="1.0" encoding="utf-8"?>
 <p:sld xmlns:a="http://schemas.openxmlformats.org/drawingml/2006/main" xmlns:r="http://schemas.openxmlformats.org/officeDocument/2006/relationships" xmlns:p="http://schemas.openxmlformats.org/presentationml/2006/main">
   <p:cSld>
@@ -4352,25 +4535,30 @@
         </p:nvSpPr>
         <p:spPr/>
         <p:txBody>
-          <a:bodyPr/>
-          <a:lstStyle/>
-          <a:p>
-            <a:endParaRPr lang="en-US" dirty="0"/>
-          </a:p>
-          <a:p>
-            <a:endParaRPr lang="en-US" dirty="0"/>
-          </a:p>
-          <a:p>
-            <a:endParaRPr lang="en-US" dirty="0"/>
-          </a:p>
-          <a:p>
-            <a:endParaRPr lang="en-US" dirty="0"/>
+          <a:bodyPr>
+            <a:normAutofit/>
+          </a:bodyPr>
+          <a:lstStyle/>
+          <a:p>
+            <a:endParaRPr lang="en-US" sz="1600" dirty="0"/>
+          </a:p>
+          <a:p>
+            <a:r>
+              <a:rPr lang="en-US" sz="1600" dirty="0"/>
+              <a:t>Apply the learnings from the course to build a dashboard for investors &amp; traders to make informed financial decisions.</a:t>
+            </a:r>
+          </a:p>
+          <a:p>
+            <a:endParaRPr lang="en-US" sz="1600" dirty="0"/>
+          </a:p>
+          <a:p>
+            <a:endParaRPr lang="en-US" sz="1600" dirty="0"/>
           </a:p>
           <a:p>
             <a:pPr marL="0" indent="0">
               <a:buNone/>
             </a:pPr>
-            <a:endParaRPr lang="en-US" dirty="0"/>
+            <a:endParaRPr lang="en-US" sz="1600" dirty="0"/>
           </a:p>
         </p:txBody>
       </p:sp>
@@ -4423,97 +4611,54 @@
           <a:p>
             <a:r>
               <a:rPr lang="en-US" dirty="0"/>
-              <a:t>Analysis</a:t>
-            </a:r>
-          </a:p>
-        </p:txBody>
-      </p:sp>
-      <p:sp>
-        <p:nvSpPr>
-          <p:cNvPr id="5" name="Text Placeholder 4"/>
-          <p:cNvSpPr>
-            <a:spLocks noGrp="1"/>
-          </p:cNvSpPr>
-          <p:nvPr>
-            <p:ph type="body" idx="1"/>
-          </p:nvPr>
-        </p:nvSpPr>
-        <p:spPr/>
-        <p:txBody>
-          <a:bodyPr/>
-          <a:lstStyle/>
-          <a:p>
-            <a:r>
-              <a:rPr lang="en-US" dirty="0"/>
-              <a:t>Returns</a:t>
-            </a:r>
-          </a:p>
-        </p:txBody>
-      </p:sp>
-      <p:sp>
-        <p:nvSpPr>
-          <p:cNvPr id="6" name="Content Placeholder 5"/>
-          <p:cNvSpPr>
-            <a:spLocks noGrp="1"/>
-          </p:cNvSpPr>
-          <p:nvPr>
-            <p:ph sz="half" idx="2"/>
-          </p:nvPr>
-        </p:nvSpPr>
-        <p:spPr/>
-        <p:txBody>
-          <a:bodyPr/>
-          <a:lstStyle/>
-          <a:p>
-            <a:endParaRPr lang="en-US" dirty="0"/>
-          </a:p>
-        </p:txBody>
-      </p:sp>
-      <p:sp>
-        <p:nvSpPr>
-          <p:cNvPr id="7" name="Text Placeholder 6"/>
-          <p:cNvSpPr>
-            <a:spLocks noGrp="1"/>
-          </p:cNvSpPr>
-          <p:nvPr>
-            <p:ph type="body" sz="quarter" idx="3"/>
-          </p:nvPr>
-        </p:nvSpPr>
-        <p:spPr/>
-        <p:txBody>
-          <a:bodyPr/>
-          <a:lstStyle/>
-          <a:p>
-            <a:r>
-              <a:rPr lang="en-US" dirty="0"/>
-              <a:t>Volume</a:t>
-            </a:r>
-          </a:p>
-        </p:txBody>
-      </p:sp>
-      <p:sp>
-        <p:nvSpPr>
-          <p:cNvPr id="8" name="Content Placeholder 7"/>
-          <p:cNvSpPr>
-            <a:spLocks noGrp="1"/>
-          </p:cNvSpPr>
-          <p:nvPr>
-            <p:ph sz="quarter" idx="4"/>
-          </p:nvPr>
-        </p:nvSpPr>
-        <p:spPr/>
-        <p:txBody>
-          <a:bodyPr/>
-          <a:lstStyle/>
-          <a:p>
-            <a:endParaRPr lang="en-US" dirty="0"/>
+              <a:t>Background</a:t>
+            </a:r>
+          </a:p>
+        </p:txBody>
+      </p:sp>
+      <p:sp>
+        <p:nvSpPr>
+          <p:cNvPr id="5" name="Content Placeholder 4"/>
+          <p:cNvSpPr>
+            <a:spLocks noGrp="1"/>
+          </p:cNvSpPr>
+          <p:nvPr>
+            <p:ph idx="1"/>
+          </p:nvPr>
+        </p:nvSpPr>
+        <p:spPr/>
+        <p:txBody>
+          <a:bodyPr>
+            <a:normAutofit/>
+          </a:bodyPr>
+          <a:lstStyle/>
+          <a:p>
+            <a:endParaRPr lang="en-US" sz="1600" dirty="0"/>
+          </a:p>
+          <a:p>
+            <a:r>
+              <a:rPr lang="en-US" sz="1600" dirty="0"/>
+              <a:t>Apply the learnings from the course to build a dashboard for investors &amp; traders to make informed financial decisions.</a:t>
+            </a:r>
+          </a:p>
+          <a:p>
+            <a:endParaRPr lang="en-US" sz="1600" dirty="0"/>
+          </a:p>
+          <a:p>
+            <a:endParaRPr lang="en-US" sz="1600" dirty="0"/>
+          </a:p>
+          <a:p>
+            <a:pPr marL="0" indent="0">
+              <a:buNone/>
+            </a:pPr>
+            <a:endParaRPr lang="en-US" sz="1600" dirty="0"/>
           </a:p>
         </p:txBody>
       </p:sp>
     </p:spTree>
     <p:extLst>
       <p:ext uri="{BB962C8B-B14F-4D97-AF65-F5344CB8AC3E}">
-        <p14:creationId xmlns:p14="http://schemas.microsoft.com/office/powerpoint/2010/main" val="4170783713"/>
+        <p14:creationId xmlns:p14="http://schemas.microsoft.com/office/powerpoint/2010/main" val="1243707109"/>
       </p:ext>
     </p:extLst>
   </p:cSld>
@@ -4542,13 +4687,7 @@
       </p:grpSpPr>
       <p:sp>
         <p:nvSpPr>
-          <p:cNvPr id="2" name="Title 1">
-            <a:extLst>
-              <a:ext uri="{FF2B5EF4-FFF2-40B4-BE49-F238E27FC236}">
-                <a16:creationId xmlns:a16="http://schemas.microsoft.com/office/drawing/2014/main" id="{FEA38C25-27E3-D56A-E0A7-B2C4631A6B0B}"/>
-              </a:ext>
-            </a:extLst>
-          </p:cNvPr>
+          <p:cNvPr id="4" name="Title 3"/>
           <p:cNvSpPr>
             <a:spLocks noGrp="1"/>
           </p:cNvSpPr>
@@ -4558,25 +4697,43 @@
         </p:nvSpPr>
         <p:spPr/>
         <p:txBody>
-          <a:bodyPr/>
+          <a:bodyPr>
+            <a:normAutofit/>
+          </a:bodyPr>
           <a:lstStyle/>
           <a:p>
             <a:r>
               <a:rPr lang="en-US" dirty="0"/>
-              <a:t>Screener</a:t>
-            </a:r>
-          </a:p>
-        </p:txBody>
-      </p:sp>
-      <p:sp>
-        <p:nvSpPr>
-          <p:cNvPr id="4" name="Content Placeholder 3">
-            <a:extLst>
-              <a:ext uri="{FF2B5EF4-FFF2-40B4-BE49-F238E27FC236}">
-                <a16:creationId xmlns:a16="http://schemas.microsoft.com/office/drawing/2014/main" id="{3C20A077-8DE0-C8D4-8050-1539A31FDBFA}"/>
-              </a:ext>
-            </a:extLst>
-          </p:cNvPr>
+              <a:t>Analysis</a:t>
+            </a:r>
+          </a:p>
+        </p:txBody>
+      </p:sp>
+      <p:sp>
+        <p:nvSpPr>
+          <p:cNvPr id="5" name="Text Placeholder 4"/>
+          <p:cNvSpPr>
+            <a:spLocks noGrp="1"/>
+          </p:cNvSpPr>
+          <p:nvPr>
+            <p:ph type="body" idx="1"/>
+          </p:nvPr>
+        </p:nvSpPr>
+        <p:spPr/>
+        <p:txBody>
+          <a:bodyPr/>
+          <a:lstStyle/>
+          <a:p>
+            <a:r>
+              <a:rPr lang="en-US" dirty="0"/>
+              <a:t>Returns</a:t>
+            </a:r>
+          </a:p>
+        </p:txBody>
+      </p:sp>
+      <p:sp>
+        <p:nvSpPr>
+          <p:cNvPr id="6" name="Content Placeholder 5"/>
           <p:cNvSpPr>
             <a:spLocks noGrp="1"/>
           </p:cNvSpPr>
@@ -4584,12 +4741,48 @@
             <p:ph sz="half" idx="2"/>
           </p:nvPr>
         </p:nvSpPr>
-        <p:spPr>
-          <a:xfrm>
-            <a:off x="522131" y="1725433"/>
-            <a:ext cx="7747226" cy="2700899"/>
-          </a:xfrm>
-        </p:spPr>
+        <p:spPr/>
+        <p:txBody>
+          <a:bodyPr/>
+          <a:lstStyle/>
+          <a:p>
+            <a:endParaRPr lang="en-US" dirty="0"/>
+          </a:p>
+        </p:txBody>
+      </p:sp>
+      <p:sp>
+        <p:nvSpPr>
+          <p:cNvPr id="7" name="Text Placeholder 6"/>
+          <p:cNvSpPr>
+            <a:spLocks noGrp="1"/>
+          </p:cNvSpPr>
+          <p:nvPr>
+            <p:ph type="body" sz="quarter" idx="3"/>
+          </p:nvPr>
+        </p:nvSpPr>
+        <p:spPr/>
+        <p:txBody>
+          <a:bodyPr/>
+          <a:lstStyle/>
+          <a:p>
+            <a:r>
+              <a:rPr lang="en-US" dirty="0"/>
+              <a:t>Volume</a:t>
+            </a:r>
+          </a:p>
+        </p:txBody>
+      </p:sp>
+      <p:sp>
+        <p:nvSpPr>
+          <p:cNvPr id="8" name="Content Placeholder 7"/>
+          <p:cNvSpPr>
+            <a:spLocks noGrp="1"/>
+          </p:cNvSpPr>
+          <p:nvPr>
+            <p:ph sz="quarter" idx="4"/>
+          </p:nvPr>
+        </p:nvSpPr>
+        <p:spPr/>
         <p:txBody>
           <a:bodyPr/>
           <a:lstStyle/>
@@ -4601,7 +4794,7 @@
     </p:spTree>
     <p:extLst>
       <p:ext uri="{BB962C8B-B14F-4D97-AF65-F5344CB8AC3E}">
-        <p14:creationId xmlns:p14="http://schemas.microsoft.com/office/powerpoint/2010/main" val="1095276417"/>
+        <p14:creationId xmlns:p14="http://schemas.microsoft.com/office/powerpoint/2010/main" val="4170783713"/>
       </p:ext>
     </p:extLst>
   </p:cSld>
@@ -4633,7 +4826,7 @@
           <p:cNvPr id="2" name="Title 1">
             <a:extLst>
               <a:ext uri="{FF2B5EF4-FFF2-40B4-BE49-F238E27FC236}">
-                <a16:creationId xmlns:a16="http://schemas.microsoft.com/office/drawing/2014/main" id="{0B107FD4-D50A-EFB8-3D1A-89B84BBA8927}"/>
+                <a16:creationId xmlns:a16="http://schemas.microsoft.com/office/drawing/2014/main" id="{FEA38C25-27E3-D56A-E0A7-B2C4631A6B0B}"/>
               </a:ext>
             </a:extLst>
           </p:cNvPr>
@@ -4651,17 +4844,17 @@
           <a:p>
             <a:r>
               <a:rPr lang="en-US" dirty="0"/>
-              <a:t>Predictions</a:t>
-            </a:r>
-          </a:p>
-        </p:txBody>
-      </p:sp>
-      <p:sp>
-        <p:nvSpPr>
-          <p:cNvPr id="4" name="Content Placeholder 3">
+              <a:t>Screener</a:t>
+            </a:r>
+          </a:p>
+        </p:txBody>
+      </p:sp>
+      <p:sp>
+        <p:nvSpPr>
+          <p:cNvPr id="8" name="Content Placeholder 7">
             <a:extLst>
               <a:ext uri="{FF2B5EF4-FFF2-40B4-BE49-F238E27FC236}">
-                <a16:creationId xmlns:a16="http://schemas.microsoft.com/office/drawing/2014/main" id="{2CE2EC33-FD11-A3B0-1DAD-70DC1FD57A87}"/>
+                <a16:creationId xmlns:a16="http://schemas.microsoft.com/office/drawing/2014/main" id="{21A27ACF-A08D-364D-99A9-7CADCF2F3D83}"/>
               </a:ext>
             </a:extLst>
           </p:cNvPr>
@@ -4669,30 +4862,62 @@
             <a:spLocks noGrp="1"/>
           </p:cNvSpPr>
           <p:nvPr>
-            <p:ph sz="half" idx="2"/>
-          </p:nvPr>
-        </p:nvSpPr>
-        <p:spPr>
-          <a:xfrm>
-            <a:off x="522130" y="1804946"/>
-            <a:ext cx="7389417" cy="2621386"/>
-          </a:xfrm>
-        </p:spPr>
-        <p:txBody>
-          <a:bodyPr/>
-          <a:lstStyle/>
-          <a:p>
-            <a:pPr marL="0" indent="0" algn="l">
-              <a:buNone/>
-            </a:pPr>
-            <a:endParaRPr lang="en-US" dirty="0"/>
+            <p:ph idx="1"/>
+          </p:nvPr>
+        </p:nvSpPr>
+        <p:spPr/>
+        <p:txBody>
+          <a:bodyPr>
+            <a:normAutofit/>
+          </a:bodyPr>
+          <a:lstStyle/>
+          <a:p>
+            <a:r>
+              <a:rPr lang="en-US" sz="1800" dirty="0"/>
+              <a:t>Goal: Screen stocks to identify new stocks from a pool based on a set of criteria.</a:t>
+            </a:r>
+          </a:p>
+          <a:p>
+            <a:endParaRPr lang="en-US" sz="1800" dirty="0"/>
+          </a:p>
+          <a:p>
+            <a:r>
+              <a:rPr lang="en-US" sz="1800" dirty="0"/>
+              <a:t>Limit the pool of stocks to NASDAQ100.</a:t>
+            </a:r>
+          </a:p>
+          <a:p>
+            <a:endParaRPr lang="en-US" sz="1800" dirty="0"/>
+          </a:p>
+          <a:p>
+            <a:r>
+              <a:rPr lang="en-US" sz="1800" dirty="0"/>
+              <a:t>The criteria used to screen the pool are the market cap &amp; sector info.</a:t>
+            </a:r>
+          </a:p>
+          <a:p>
+            <a:endParaRPr lang="en-US" sz="1800" dirty="0"/>
+          </a:p>
+          <a:p>
+            <a:r>
+              <a:rPr lang="en-US" sz="1800" dirty="0"/>
+              <a:t>This idea can be very easily extended to a much larger pool of stocks &amp; more customized </a:t>
+            </a:r>
+            <a:r>
+              <a:rPr lang="en-US" sz="1800" dirty="0" err="1"/>
+              <a:t>criterias</a:t>
+            </a:r>
+            <a:r>
+              <a:rPr lang="en-US" sz="1800" dirty="0"/>
+              <a:t>.</a:t>
+            </a:r>
           </a:p>
         </p:txBody>
       </p:sp>
     </p:spTree>
     <p:extLst>
       <p:ext uri="{BB962C8B-B14F-4D97-AF65-F5344CB8AC3E}">
-        <p14:creationId xmlns:p14="http://schemas.microsoft.com/office/powerpoint/2010/main" val="937049816"/>
+        <p14:creationId xmlns:p14="http://schemas.microsoft.com/office/powerpoint/2010/main" val="1095276417"/>
       </p:ext>
     </p:extLst>
   </p:cSld>
@@ -4724,7 +4949,7 @@
           <p:cNvPr id="2" name="Title 1">
             <a:extLst>
               <a:ext uri="{FF2B5EF4-FFF2-40B4-BE49-F238E27FC236}">
-                <a16:creationId xmlns:a16="http://schemas.microsoft.com/office/drawing/2014/main" id="{7FC22D4A-99A4-D298-0239-D2848EC513D3}"/>
+                <a16:creationId xmlns:a16="http://schemas.microsoft.com/office/drawing/2014/main" id="{FEA38C25-27E3-D56A-E0A7-B2C4631A6B0B}"/>
               </a:ext>
             </a:extLst>
           </p:cNvPr>
@@ -4742,45 +4967,50 @@
           <a:p>
             <a:r>
               <a:rPr lang="en-US" dirty="0"/>
-              <a:t>Challenges</a:t>
-            </a:r>
-          </a:p>
-        </p:txBody>
-      </p:sp>
-      <p:sp>
-        <p:nvSpPr>
+              <a:t>Screener</a:t>
+            </a:r>
+          </a:p>
+        </p:txBody>
+      </p:sp>
+      <p:pic>
+        <p:nvPicPr>
           <p:cNvPr id="4" name="Content Placeholder 3">
             <a:extLst>
               <a:ext uri="{FF2B5EF4-FFF2-40B4-BE49-F238E27FC236}">
-                <a16:creationId xmlns:a16="http://schemas.microsoft.com/office/drawing/2014/main" id="{454A1188-8A49-076D-46DF-B11DB8F0E9C6}"/>
+                <a16:creationId xmlns:a16="http://schemas.microsoft.com/office/drawing/2014/main" id="{681F6A1C-9BA7-BD40-8C65-50CD3AE7D16D}"/>
               </a:ext>
             </a:extLst>
           </p:cNvPr>
-          <p:cNvSpPr>
-            <a:spLocks noGrp="1"/>
-          </p:cNvSpPr>
-          <p:nvPr>
-            <p:ph sz="half" idx="2"/>
-          </p:nvPr>
-        </p:nvSpPr>
+          <p:cNvPicPr>
+            <a:picLocks noGrp="1" noChangeAspect="1"/>
+          </p:cNvPicPr>
+          <p:nvPr>
+            <p:ph idx="1"/>
+          </p:nvPr>
+        </p:nvPicPr>
+        <p:blipFill>
+          <a:blip r:embed="rId2">
+            <a:extLst>
+              <a:ext uri="{28A0092B-C50C-407E-A947-70E740481C1C}">
+                <a14:useLocalDpi xmlns:a14="http://schemas.microsoft.com/office/drawing/2010/main" val="0"/>
+              </a:ext>
+            </a:extLst>
+          </a:blip>
+          <a:stretch>
+            <a:fillRect/>
+          </a:stretch>
+        </p:blipFill>
         <p:spPr>
           <a:xfrm>
-            <a:off x="522130" y="1682496"/>
-            <a:ext cx="7890349" cy="2743836"/>
+            <a:off x="2197101" y="1106269"/>
+            <a:ext cx="5674690" cy="3162320"/>
           </a:xfrm>
         </p:spPr>
-        <p:txBody>
-          <a:bodyPr/>
-          <a:lstStyle/>
-          <a:p>
-            <a:endParaRPr lang="en-US" dirty="0"/>
-          </a:p>
-        </p:txBody>
-      </p:sp>
+      </p:pic>
     </p:spTree>
     <p:extLst>
       <p:ext uri="{BB962C8B-B14F-4D97-AF65-F5344CB8AC3E}">
-        <p14:creationId xmlns:p14="http://schemas.microsoft.com/office/powerpoint/2010/main" val="2943613975"/>
+        <p14:creationId xmlns:p14="http://schemas.microsoft.com/office/powerpoint/2010/main" val="4058307429"/>
       </p:ext>
     </p:extLst>
   </p:cSld>
@@ -4812,7 +5042,7 @@
           <p:cNvPr id="2" name="Title 1">
             <a:extLst>
               <a:ext uri="{FF2B5EF4-FFF2-40B4-BE49-F238E27FC236}">
-                <a16:creationId xmlns:a16="http://schemas.microsoft.com/office/drawing/2014/main" id="{D7DBB1DF-0100-0028-3F9D-F1034800CEEF}"/>
+                <a16:creationId xmlns:a16="http://schemas.microsoft.com/office/drawing/2014/main" id="{0B107FD4-D50A-EFB8-3D1A-89B84BBA8927}"/>
               </a:ext>
             </a:extLst>
           </p:cNvPr>
@@ -4830,7 +5060,7 @@
           <a:p>
             <a:r>
               <a:rPr lang="en-US" dirty="0"/>
-              <a:t>Expansion Ideas</a:t>
+              <a:t>Predictions</a:t>
             </a:r>
           </a:p>
         </p:txBody>
@@ -4840,7 +5070,7 @@
           <p:cNvPr id="4" name="Content Placeholder 3">
             <a:extLst>
               <a:ext uri="{FF2B5EF4-FFF2-40B4-BE49-F238E27FC236}">
-                <a16:creationId xmlns:a16="http://schemas.microsoft.com/office/drawing/2014/main" id="{4EAD05A2-F885-24DD-93E6-2835EE2D20D3}"/>
+                <a16:creationId xmlns:a16="http://schemas.microsoft.com/office/drawing/2014/main" id="{2CE2EC33-FD11-A3B0-1DAD-70DC1FD57A87}"/>
               </a:ext>
             </a:extLst>
           </p:cNvPr>
@@ -4853,14 +5083,17 @@
         </p:nvSpPr>
         <p:spPr>
           <a:xfrm>
-            <a:off x="522130" y="1673352"/>
-            <a:ext cx="7725757" cy="2752980"/>
+            <a:off x="522130" y="1804946"/>
+            <a:ext cx="7389417" cy="2621386"/>
           </a:xfrm>
         </p:spPr>
         <p:txBody>
           <a:bodyPr/>
           <a:lstStyle/>
           <a:p>
+            <a:pPr marL="0" indent="0" algn="l">
+              <a:buNone/>
+            </a:pPr>
             <a:endParaRPr lang="en-US" dirty="0"/>
           </a:p>
         </p:txBody>
@@ -4868,7 +5101,7 @@
     </p:spTree>
     <p:extLst>
       <p:ext uri="{BB962C8B-B14F-4D97-AF65-F5344CB8AC3E}">
-        <p14:creationId xmlns:p14="http://schemas.microsoft.com/office/powerpoint/2010/main" val="3248198280"/>
+        <p14:creationId xmlns:p14="http://schemas.microsoft.com/office/powerpoint/2010/main" val="937049816"/>
       </p:ext>
     </p:extLst>
   </p:cSld>
@@ -4897,43 +5130,66 @@
       </p:grpSpPr>
       <p:sp>
         <p:nvSpPr>
-          <p:cNvPr id="4" name="TextBox 3">
+          <p:cNvPr id="2" name="Title 1">
             <a:extLst>
               <a:ext uri="{FF2B5EF4-FFF2-40B4-BE49-F238E27FC236}">
-                <a16:creationId xmlns:a16="http://schemas.microsoft.com/office/drawing/2014/main" id="{051D674C-A884-F0EF-625A-4D3B1999007F}"/>
+                <a16:creationId xmlns:a16="http://schemas.microsoft.com/office/drawing/2014/main" id="{7FC22D4A-99A4-D298-0239-D2848EC513D3}"/>
               </a:ext>
             </a:extLst>
           </p:cNvPr>
-          <p:cNvSpPr txBox="1"/>
-          <p:nvPr/>
+          <p:cNvSpPr>
+            <a:spLocks noGrp="1"/>
+          </p:cNvSpPr>
+          <p:nvPr>
+            <p:ph type="title"/>
+          </p:nvPr>
+        </p:nvSpPr>
+        <p:spPr/>
+        <p:txBody>
+          <a:bodyPr/>
+          <a:lstStyle/>
+          <a:p>
+            <a:r>
+              <a:rPr lang="en-US" dirty="0"/>
+              <a:t>Challenges</a:t>
+            </a:r>
+          </a:p>
+        </p:txBody>
+      </p:sp>
+      <p:sp>
+        <p:nvSpPr>
+          <p:cNvPr id="4" name="Content Placeholder 3">
+            <a:extLst>
+              <a:ext uri="{FF2B5EF4-FFF2-40B4-BE49-F238E27FC236}">
+                <a16:creationId xmlns:a16="http://schemas.microsoft.com/office/drawing/2014/main" id="{454A1188-8A49-076D-46DF-B11DB8F0E9C6}"/>
+              </a:ext>
+            </a:extLst>
+          </p:cNvPr>
+          <p:cNvSpPr>
+            <a:spLocks noGrp="1"/>
+          </p:cNvSpPr>
+          <p:nvPr>
+            <p:ph sz="half" idx="2"/>
+          </p:nvPr>
         </p:nvSpPr>
         <p:spPr>
           <a:xfrm>
-            <a:off x="3941064" y="2313432"/>
-            <a:ext cx="2587752" cy="523220"/>
+            <a:off x="522130" y="1682496"/>
+            <a:ext cx="7890349" cy="2743836"/>
           </a:xfrm>
-          <a:prstGeom prst="rect">
-            <a:avLst/>
-          </a:prstGeom>
-          <a:noFill/>
         </p:spPr>
         <p:txBody>
-          <a:bodyPr wrap="square" rtlCol="0">
-            <a:spAutoFit/>
-          </a:bodyPr>
-          <a:lstStyle/>
-          <a:p>
-            <a:r>
-              <a:rPr lang="en-US" sz="2800" b="1" dirty="0"/>
-              <a:t>Questions?</a:t>
-            </a:r>
+          <a:bodyPr/>
+          <a:lstStyle/>
+          <a:p>
+            <a:endParaRPr lang="en-US" dirty="0"/>
           </a:p>
         </p:txBody>
       </p:sp>
     </p:spTree>
     <p:extLst>
       <p:ext uri="{BB962C8B-B14F-4D97-AF65-F5344CB8AC3E}">
-        <p14:creationId xmlns:p14="http://schemas.microsoft.com/office/powerpoint/2010/main" val="109100692"/>
+        <p14:creationId xmlns:p14="http://schemas.microsoft.com/office/powerpoint/2010/main" val="2943613975"/>
       </p:ext>
     </p:extLst>
   </p:cSld>

</xml_diff>